<commit_message>
add in extra slide
</commit_message>
<xml_diff>
--- a/docs/2223/lectures/jk_img_sandbox/rt_example.pptx
+++ b/docs/2223/lectures/jk_img_sandbox/rt_example.pptx
@@ -17,6 +17,7 @@
     <p:sldId id="265" r:id="rId11"/>
     <p:sldId id="263" r:id="rId12"/>
     <p:sldId id="270" r:id="rId13"/>
+    <p:sldId id="271" r:id="rId14"/>
   </p:sldIdLst>
   <p:sldSz cx="12192000" cy="6858000"/>
   <p:notesSz cx="6858000" cy="9144000"/>
@@ -22067,6 +22068,1237 @@
 </p:sld>
 </file>
 
+<file path=ppt/slides/slide13.xml><?xml version="1.0" encoding="utf-8"?>
+<p:sld xmlns:a="http://schemas.openxmlformats.org/drawingml/2006/main" xmlns:r="http://schemas.openxmlformats.org/officeDocument/2006/relationships" xmlns:p="http://schemas.openxmlformats.org/presentationml/2006/main">
+  <p:cSld>
+    <p:spTree>
+      <p:nvGrpSpPr>
+        <p:cNvPr id="1" name=""/>
+        <p:cNvGrpSpPr/>
+        <p:nvPr/>
+      </p:nvGrpSpPr>
+      <p:grpSpPr>
+        <a:xfrm>
+          <a:off x="0" y="0"/>
+          <a:ext cx="0" cy="0"/>
+          <a:chOff x="0" y="0"/>
+          <a:chExt cx="0" cy="0"/>
+        </a:xfrm>
+      </p:grpSpPr>
+      <p:cxnSp>
+        <p:nvCxnSpPr>
+          <p:cNvPr id="5" name="Straight Arrow Connector 4"/>
+          <p:cNvCxnSpPr/>
+          <p:nvPr/>
+        </p:nvCxnSpPr>
+        <p:spPr>
+          <a:xfrm>
+            <a:off x="2568633" y="5336771"/>
+            <a:ext cx="6317672" cy="0"/>
+          </a:xfrm>
+          <a:prstGeom prst="straightConnector1">
+            <a:avLst/>
+          </a:prstGeom>
+          <a:ln w="28575">
+            <a:solidFill>
+              <a:schemeClr val="tx1"/>
+            </a:solidFill>
+            <a:tailEnd type="triangle"/>
+          </a:ln>
+        </p:spPr>
+        <p:style>
+          <a:lnRef idx="1">
+            <a:schemeClr val="accent1"/>
+          </a:lnRef>
+          <a:fillRef idx="0">
+            <a:schemeClr val="accent1"/>
+          </a:fillRef>
+          <a:effectRef idx="0">
+            <a:schemeClr val="accent1"/>
+          </a:effectRef>
+          <a:fontRef idx="minor">
+            <a:schemeClr val="tx1"/>
+          </a:fontRef>
+        </p:style>
+      </p:cxnSp>
+      <p:cxnSp>
+        <p:nvCxnSpPr>
+          <p:cNvPr id="7" name="Straight Arrow Connector 6"/>
+          <p:cNvCxnSpPr/>
+          <p:nvPr/>
+        </p:nvCxnSpPr>
+        <p:spPr>
+          <a:xfrm flipV="1">
+            <a:off x="2568633" y="1396538"/>
+            <a:ext cx="0" cy="3940233"/>
+          </a:xfrm>
+          <a:prstGeom prst="straightConnector1">
+            <a:avLst/>
+          </a:prstGeom>
+          <a:ln w="28575">
+            <a:solidFill>
+              <a:schemeClr val="tx1"/>
+            </a:solidFill>
+            <a:tailEnd type="triangle"/>
+          </a:ln>
+        </p:spPr>
+        <p:style>
+          <a:lnRef idx="1">
+            <a:schemeClr val="accent1"/>
+          </a:lnRef>
+          <a:fillRef idx="0">
+            <a:schemeClr val="accent1"/>
+          </a:fillRef>
+          <a:effectRef idx="0">
+            <a:schemeClr val="accent1"/>
+          </a:effectRef>
+          <a:fontRef idx="minor">
+            <a:schemeClr val="tx1"/>
+          </a:fontRef>
+        </p:style>
+      </p:cxnSp>
+      <p:cxnSp>
+        <p:nvCxnSpPr>
+          <p:cNvPr id="12" name="Straight Connector 11"/>
+          <p:cNvCxnSpPr/>
+          <p:nvPr/>
+        </p:nvCxnSpPr>
+        <p:spPr>
+          <a:xfrm flipV="1">
+            <a:off x="2568633" y="2202873"/>
+            <a:ext cx="6059978" cy="1612670"/>
+          </a:xfrm>
+          <a:prstGeom prst="line">
+            <a:avLst/>
+          </a:prstGeom>
+          <a:ln w="28575"/>
+        </p:spPr>
+        <p:style>
+          <a:lnRef idx="1">
+            <a:schemeClr val="accent1"/>
+          </a:lnRef>
+          <a:fillRef idx="0">
+            <a:schemeClr val="accent1"/>
+          </a:fillRef>
+          <a:effectRef idx="0">
+            <a:schemeClr val="accent1"/>
+          </a:effectRef>
+          <a:fontRef idx="minor">
+            <a:schemeClr val="tx1"/>
+          </a:fontRef>
+        </p:style>
+      </p:cxnSp>
+      <p:sp>
+        <p:nvSpPr>
+          <p:cNvPr id="62" name="Oval 19"/>
+          <p:cNvSpPr>
+            <a:spLocks noChangeArrowheads="1"/>
+          </p:cNvSpPr>
+          <p:nvPr/>
+        </p:nvSpPr>
+        <p:spPr bwMode="auto">
+          <a:xfrm rot="210749">
+            <a:off x="7009168" y="2144839"/>
+            <a:ext cx="57150" cy="57150"/>
+          </a:xfrm>
+          <a:prstGeom prst="ellipse">
+            <a:avLst/>
+          </a:prstGeom>
+          <a:solidFill>
+            <a:schemeClr val="accent2"/>
+          </a:solidFill>
+          <a:ln w="9525" cap="rnd">
+            <a:solidFill>
+              <a:srgbClr val="000000"/>
+            </a:solidFill>
+            <a:prstDash val="solid"/>
+            <a:round/>
+            <a:headEnd/>
+            <a:tailEnd/>
+          </a:ln>
+          <a:extLst/>
+        </p:spPr>
+        <p:txBody>
+          <a:bodyPr vert="horz" wrap="square" lIns="91440" tIns="45720" rIns="91440" bIns="45720" numCol="1" anchor="t" anchorCtr="0" compatLnSpc="1">
+            <a:prstTxWarp prst="textNoShape">
+              <a:avLst/>
+            </a:prstTxWarp>
+          </a:bodyPr>
+          <a:lstStyle/>
+          <a:p>
+            <a:endParaRPr lang="en-GB"/>
+          </a:p>
+        </p:txBody>
+      </p:sp>
+      <p:sp>
+        <p:nvSpPr>
+          <p:cNvPr id="116" name="Oval 19"/>
+          <p:cNvSpPr>
+            <a:spLocks noChangeArrowheads="1"/>
+          </p:cNvSpPr>
+          <p:nvPr/>
+        </p:nvSpPr>
+        <p:spPr bwMode="auto">
+          <a:xfrm>
+            <a:off x="3254114" y="4238396"/>
+            <a:ext cx="57150" cy="57150"/>
+          </a:xfrm>
+          <a:prstGeom prst="ellipse">
+            <a:avLst/>
+          </a:prstGeom>
+          <a:solidFill>
+            <a:schemeClr val="accent6"/>
+          </a:solidFill>
+          <a:ln w="9525" cap="rnd">
+            <a:solidFill>
+              <a:srgbClr val="000000"/>
+            </a:solidFill>
+            <a:prstDash val="solid"/>
+            <a:round/>
+            <a:headEnd/>
+            <a:tailEnd/>
+          </a:ln>
+          <a:extLst/>
+        </p:spPr>
+        <p:txBody>
+          <a:bodyPr vert="horz" wrap="square" lIns="91440" tIns="45720" rIns="91440" bIns="45720" numCol="1" anchor="t" anchorCtr="0" compatLnSpc="1">
+            <a:prstTxWarp prst="textNoShape">
+              <a:avLst/>
+            </a:prstTxWarp>
+          </a:bodyPr>
+          <a:lstStyle/>
+          <a:p>
+            <a:endParaRPr lang="en-GB"/>
+          </a:p>
+        </p:txBody>
+      </p:sp>
+      <p:sp>
+        <p:nvSpPr>
+          <p:cNvPr id="121" name="TextBox 120"/>
+          <p:cNvSpPr txBox="1"/>
+          <p:nvPr/>
+        </p:nvSpPr>
+        <p:spPr>
+          <a:xfrm>
+            <a:off x="7211621" y="1802373"/>
+            <a:ext cx="755335" cy="369332"/>
+          </a:xfrm>
+          <a:prstGeom prst="rect">
+            <a:avLst/>
+          </a:prstGeom>
+          <a:noFill/>
+          <a:ln>
+            <a:solidFill>
+              <a:schemeClr val="accent2"/>
+            </a:solidFill>
+          </a:ln>
+        </p:spPr>
+        <p:txBody>
+          <a:bodyPr wrap="none" rtlCol="0">
+            <a:spAutoFit/>
+          </a:bodyPr>
+          <a:lstStyle/>
+          <a:p>
+            <a:r>
+              <a:rPr lang="en-GB" dirty="0" smtClean="0"/>
+              <a:t>Josiah</a:t>
+            </a:r>
+            <a:endParaRPr lang="en-GB" dirty="0"/>
+          </a:p>
+        </p:txBody>
+      </p:sp>
+      <p:sp>
+        <p:nvSpPr>
+          <p:cNvPr id="122" name="TextBox 121"/>
+          <p:cNvSpPr txBox="1"/>
+          <p:nvPr/>
+        </p:nvSpPr>
+        <p:spPr>
+          <a:xfrm>
+            <a:off x="3456304" y="4088215"/>
+            <a:ext cx="582532" cy="369332"/>
+          </a:xfrm>
+          <a:prstGeom prst="rect">
+            <a:avLst/>
+          </a:prstGeom>
+          <a:noFill/>
+          <a:ln>
+            <a:solidFill>
+              <a:schemeClr val="accent6"/>
+            </a:solidFill>
+          </a:ln>
+        </p:spPr>
+        <p:txBody>
+          <a:bodyPr wrap="none" rtlCol="0">
+            <a:spAutoFit/>
+          </a:bodyPr>
+          <a:lstStyle/>
+          <a:p>
+            <a:r>
+              <a:rPr lang="en-GB" dirty="0" smtClean="0"/>
+              <a:t>Tom</a:t>
+            </a:r>
+            <a:endParaRPr lang="en-GB" dirty="0"/>
+          </a:p>
+        </p:txBody>
+      </p:sp>
+      <p:grpSp>
+        <p:nvGrpSpPr>
+          <p:cNvPr id="129" name="Group 128"/>
+          <p:cNvGrpSpPr/>
+          <p:nvPr/>
+        </p:nvGrpSpPr>
+        <p:grpSpPr>
+          <a:xfrm>
+            <a:off x="3301214" y="3396625"/>
+            <a:ext cx="833396" cy="491652"/>
+            <a:chOff x="3301214" y="3396625"/>
+            <a:chExt cx="833396" cy="491652"/>
+          </a:xfrm>
+        </p:grpSpPr>
+        <mc:AlternateContent xmlns:mc="http://schemas.openxmlformats.org/markup-compatibility/2006" xmlns:a14="http://schemas.microsoft.com/office/drawing/2010/main">
+          <mc:Choice Requires="a14">
+            <p:sp>
+              <p:nvSpPr>
+                <p:cNvPr id="123" name="TextBox 122"/>
+                <p:cNvSpPr txBox="1"/>
+                <p:nvPr/>
+              </p:nvSpPr>
+              <p:spPr>
+                <a:xfrm>
+                  <a:off x="3854918" y="3396625"/>
+                  <a:ext cx="279692" cy="276999"/>
+                </a:xfrm>
+                <a:prstGeom prst="rect">
+                  <a:avLst/>
+                </a:prstGeom>
+                <a:noFill/>
+              </p:spPr>
+              <p:txBody>
+                <a:bodyPr wrap="none" lIns="0" tIns="0" rIns="0" bIns="0" rtlCol="0">
+                  <a:spAutoFit/>
+                </a:bodyPr>
+                <a:lstStyle/>
+                <a:p>
+                  <a:pPr/>
+                  <a14:m>
+                    <m:oMathPara xmlns:m="http://schemas.openxmlformats.org/officeDocument/2006/math">
+                      <m:oMathParaPr>
+                        <m:jc m:val="centerGroup"/>
+                      </m:oMathParaPr>
+                      <m:oMath xmlns:m="http://schemas.openxmlformats.org/officeDocument/2006/math">
+                        <m:sSub>
+                          <m:sSubPr>
+                            <m:ctrlPr>
+                              <a:rPr lang="en-GB" i="1" smtClean="0">
+                                <a:latin typeface="Cambria Math" panose="02040503050406030204" pitchFamily="18" charset="0"/>
+                              </a:rPr>
+                            </m:ctrlPr>
+                          </m:sSubPr>
+                          <m:e>
+                            <m:r>
+                              <a:rPr lang="en-GB" i="1" smtClean="0">
+                                <a:latin typeface="Cambria Math" panose="02040503050406030204" pitchFamily="18" charset="0"/>
+                                <a:ea typeface="Cambria Math" panose="02040503050406030204" pitchFamily="18" charset="0"/>
+                              </a:rPr>
+                              <m:t>𝛽</m:t>
+                            </m:r>
+                          </m:e>
+                          <m:sub>
+                            <m:r>
+                              <a:rPr lang="en-GB" b="0" i="1" smtClean="0">
+                                <a:latin typeface="Cambria Math" panose="02040503050406030204" pitchFamily="18" charset="0"/>
+                              </a:rPr>
+                              <m:t>1</m:t>
+                            </m:r>
+                          </m:sub>
+                        </m:sSub>
+                      </m:oMath>
+                    </m:oMathPara>
+                  </a14:m>
+                  <a:endParaRPr lang="en-GB" dirty="0"/>
+                </a:p>
+              </p:txBody>
+            </p:sp>
+          </mc:Choice>
+          <mc:Fallback xmlns="">
+            <p:sp>
+              <p:nvSpPr>
+                <p:cNvPr id="123" name="TextBox 122"/>
+                <p:cNvSpPr txBox="1">
+                  <a:spLocks noRot="1" noChangeAspect="1" noMove="1" noResize="1" noEditPoints="1" noAdjustHandles="1" noChangeArrowheads="1" noChangeShapeType="1" noTextEdit="1"/>
+                </p:cNvSpPr>
+                <p:nvPr/>
+              </p:nvSpPr>
+              <p:spPr>
+                <a:xfrm>
+                  <a:off x="3854918" y="3396625"/>
+                  <a:ext cx="279692" cy="276999"/>
+                </a:xfrm>
+                <a:prstGeom prst="rect">
+                  <a:avLst/>
+                </a:prstGeom>
+                <a:blipFill>
+                  <a:blip r:embed="rId2"/>
+                  <a:stretch>
+                    <a:fillRect l="-30435" t="-2174" r="-8696" b="-32609"/>
+                  </a:stretch>
+                </a:blipFill>
+              </p:spPr>
+              <p:txBody>
+                <a:bodyPr/>
+                <a:lstStyle/>
+                <a:p>
+                  <a:r>
+                    <a:rPr lang="en-GB">
+                      <a:noFill/>
+                    </a:rPr>
+                    <a:t> </a:t>
+                  </a:r>
+                </a:p>
+              </p:txBody>
+            </p:sp>
+          </mc:Fallback>
+        </mc:AlternateContent>
+        <p:cxnSp>
+          <p:nvCxnSpPr>
+            <p:cNvPr id="124" name="Straight Connector 123"/>
+            <p:cNvCxnSpPr/>
+            <p:nvPr/>
+          </p:nvCxnSpPr>
+          <p:spPr>
+            <a:xfrm flipV="1">
+              <a:off x="3301214" y="3613715"/>
+              <a:ext cx="539487" cy="7135"/>
+            </a:xfrm>
+            <a:prstGeom prst="line">
+              <a:avLst/>
+            </a:prstGeom>
+            <a:ln w="9525">
+              <a:solidFill>
+                <a:schemeClr val="tx1"/>
+              </a:solidFill>
+              <a:prstDash val="sysDot"/>
+            </a:ln>
+          </p:spPr>
+          <p:style>
+            <a:lnRef idx="1">
+              <a:schemeClr val="accent1"/>
+            </a:lnRef>
+            <a:fillRef idx="0">
+              <a:schemeClr val="accent1"/>
+            </a:fillRef>
+            <a:effectRef idx="0">
+              <a:schemeClr val="accent1"/>
+            </a:effectRef>
+            <a:fontRef idx="minor">
+              <a:schemeClr val="tx1"/>
+            </a:fontRef>
+          </p:style>
+        </p:cxnSp>
+        <p:cxnSp>
+          <p:nvCxnSpPr>
+            <p:cNvPr id="125" name="Straight Connector 124"/>
+            <p:cNvCxnSpPr/>
+            <p:nvPr/>
+          </p:nvCxnSpPr>
+          <p:spPr>
+            <a:xfrm flipV="1">
+              <a:off x="3822100" y="3485360"/>
+              <a:ext cx="0" cy="135491"/>
+            </a:xfrm>
+            <a:prstGeom prst="line">
+              <a:avLst/>
+            </a:prstGeom>
+            <a:ln w="28575">
+              <a:solidFill>
+                <a:schemeClr val="accent5"/>
+              </a:solidFill>
+            </a:ln>
+          </p:spPr>
+          <p:style>
+            <a:lnRef idx="1">
+              <a:schemeClr val="accent1"/>
+            </a:lnRef>
+            <a:fillRef idx="0">
+              <a:schemeClr val="accent1"/>
+            </a:fillRef>
+            <a:effectRef idx="0">
+              <a:schemeClr val="accent1"/>
+            </a:effectRef>
+            <a:fontRef idx="minor">
+              <a:schemeClr val="tx1"/>
+            </a:fontRef>
+          </p:style>
+        </p:cxnSp>
+        <p:sp>
+          <p:nvSpPr>
+            <p:cNvPr id="126" name="TextBox 125"/>
+            <p:cNvSpPr txBox="1"/>
+            <p:nvPr/>
+          </p:nvSpPr>
+          <p:spPr>
+            <a:xfrm>
+              <a:off x="3456304" y="3580500"/>
+              <a:ext cx="266131" cy="307777"/>
+            </a:xfrm>
+            <a:prstGeom prst="rect">
+              <a:avLst/>
+            </a:prstGeom>
+            <a:noFill/>
+          </p:spPr>
+          <p:txBody>
+            <a:bodyPr wrap="square" rtlCol="0">
+              <a:spAutoFit/>
+            </a:bodyPr>
+            <a:lstStyle/>
+            <a:p>
+              <a:r>
+                <a:rPr lang="en-GB" sz="1400" dirty="0" smtClean="0"/>
+                <a:t>1</a:t>
+              </a:r>
+              <a:endParaRPr lang="en-GB" sz="1400" dirty="0"/>
+            </a:p>
+          </p:txBody>
+        </p:sp>
+      </p:grpSp>
+      <mc:AlternateContent xmlns:mc="http://schemas.openxmlformats.org/markup-compatibility/2006" xmlns:a14="http://schemas.microsoft.com/office/drawing/2010/main">
+        <mc:Choice Requires="a14">
+          <p:sp>
+            <p:nvSpPr>
+              <p:cNvPr id="135" name="TextBox 134"/>
+              <p:cNvSpPr txBox="1"/>
+              <p:nvPr/>
+            </p:nvSpPr>
+            <p:spPr>
+              <a:xfrm>
+                <a:off x="2283621" y="3670655"/>
+                <a:ext cx="285013" cy="276999"/>
+              </a:xfrm>
+              <a:prstGeom prst="rect">
+                <a:avLst/>
+              </a:prstGeom>
+              <a:noFill/>
+            </p:spPr>
+            <p:txBody>
+              <a:bodyPr wrap="none" lIns="0" tIns="0" rIns="0" bIns="0" rtlCol="0">
+                <a:spAutoFit/>
+              </a:bodyPr>
+              <a:lstStyle/>
+              <a:p>
+                <a:pPr/>
+                <a14:m>
+                  <m:oMathPara xmlns:m="http://schemas.openxmlformats.org/officeDocument/2006/math">
+                    <m:oMathParaPr>
+                      <m:jc m:val="centerGroup"/>
+                    </m:oMathParaPr>
+                    <m:oMath xmlns:m="http://schemas.openxmlformats.org/officeDocument/2006/math">
+                      <m:sSub>
+                        <m:sSubPr>
+                          <m:ctrlPr>
+                            <a:rPr lang="en-GB" i="1" smtClean="0">
+                              <a:latin typeface="Cambria Math" panose="02040503050406030204" pitchFamily="18" charset="0"/>
+                            </a:rPr>
+                          </m:ctrlPr>
+                        </m:sSubPr>
+                        <m:e>
+                          <m:r>
+                            <a:rPr lang="en-GB" i="1" smtClean="0">
+                              <a:latin typeface="Cambria Math" panose="02040503050406030204" pitchFamily="18" charset="0"/>
+                              <a:ea typeface="Cambria Math" panose="02040503050406030204" pitchFamily="18" charset="0"/>
+                            </a:rPr>
+                            <m:t>𝛽</m:t>
+                          </m:r>
+                        </m:e>
+                        <m:sub>
+                          <m:r>
+                            <a:rPr lang="en-GB" b="0" i="1" smtClean="0">
+                              <a:latin typeface="Cambria Math" panose="02040503050406030204" pitchFamily="18" charset="0"/>
+                            </a:rPr>
+                            <m:t>0</m:t>
+                          </m:r>
+                        </m:sub>
+                      </m:sSub>
+                    </m:oMath>
+                  </m:oMathPara>
+                </a14:m>
+                <a:endParaRPr lang="en-GB" dirty="0"/>
+              </a:p>
+            </p:txBody>
+          </p:sp>
+        </mc:Choice>
+        <mc:Fallback xmlns="">
+          <p:sp>
+            <p:nvSpPr>
+              <p:cNvPr id="135" name="TextBox 134"/>
+              <p:cNvSpPr txBox="1">
+                <a:spLocks noRot="1" noChangeAspect="1" noMove="1" noResize="1" noEditPoints="1" noAdjustHandles="1" noChangeArrowheads="1" noChangeShapeType="1" noTextEdit="1"/>
+              </p:cNvSpPr>
+              <p:nvPr/>
+            </p:nvSpPr>
+            <p:spPr>
+              <a:xfrm>
+                <a:off x="2283621" y="3670655"/>
+                <a:ext cx="285013" cy="276999"/>
+              </a:xfrm>
+              <a:prstGeom prst="rect">
+                <a:avLst/>
+              </a:prstGeom>
+              <a:blipFill>
+                <a:blip r:embed="rId3"/>
+                <a:stretch>
+                  <a:fillRect l="-30435" t="-2174" r="-8696" b="-32609"/>
+                </a:stretch>
+              </a:blipFill>
+            </p:spPr>
+            <p:txBody>
+              <a:bodyPr/>
+              <a:lstStyle/>
+              <a:p>
+                <a:r>
+                  <a:rPr lang="en-GB">
+                    <a:noFill/>
+                  </a:rPr>
+                  <a:t> </a:t>
+                </a:r>
+              </a:p>
+            </p:txBody>
+          </p:sp>
+        </mc:Fallback>
+      </mc:AlternateContent>
+      <p:sp>
+        <p:nvSpPr>
+          <p:cNvPr id="136" name="TextBox 135"/>
+          <p:cNvSpPr txBox="1"/>
+          <p:nvPr/>
+        </p:nvSpPr>
+        <p:spPr>
+          <a:xfrm>
+            <a:off x="895500" y="3181988"/>
+            <a:ext cx="419667" cy="369332"/>
+          </a:xfrm>
+          <a:prstGeom prst="rect">
+            <a:avLst/>
+          </a:prstGeom>
+          <a:noFill/>
+        </p:spPr>
+        <p:txBody>
+          <a:bodyPr wrap="none" rtlCol="0">
+            <a:spAutoFit/>
+          </a:bodyPr>
+          <a:lstStyle/>
+          <a:p>
+            <a:r>
+              <a:rPr lang="en-GB" dirty="0" smtClean="0"/>
+              <a:t>RT</a:t>
+            </a:r>
+            <a:endParaRPr lang="en-GB" dirty="0"/>
+          </a:p>
+        </p:txBody>
+      </p:sp>
+      <mc:AlternateContent xmlns:mc="http://schemas.openxmlformats.org/markup-compatibility/2006" xmlns:a14="http://schemas.microsoft.com/office/drawing/2010/main">
+        <mc:Choice Requires="a14">
+          <p:sp>
+            <p:nvSpPr>
+              <p:cNvPr id="139" name="TextBox 138"/>
+              <p:cNvSpPr txBox="1"/>
+              <p:nvPr/>
+            </p:nvSpPr>
+            <p:spPr>
+              <a:xfrm>
+                <a:off x="2568633" y="555296"/>
+                <a:ext cx="3514477" cy="923330"/>
+              </a:xfrm>
+              <a:prstGeom prst="rect">
+                <a:avLst/>
+              </a:prstGeom>
+              <a:noFill/>
+            </p:spPr>
+            <p:txBody>
+              <a:bodyPr wrap="square" rtlCol="0">
+                <a:spAutoFit/>
+              </a:bodyPr>
+              <a:lstStyle/>
+              <a:p>
+                <a:r>
+                  <a:rPr lang="en-GB" dirty="0">
+                    <a:latin typeface="Courier New" panose="02070309020205020404" pitchFamily="49" charset="0"/>
+                    <a:cs typeface="Courier New" panose="02070309020205020404" pitchFamily="49" charset="0"/>
+                  </a:rPr>
+                  <a:t>l</a:t>
+                </a:r>
+                <a:r>
+                  <a:rPr lang="en-GB" dirty="0" smtClean="0">
+                    <a:latin typeface="Courier New" panose="02070309020205020404" pitchFamily="49" charset="0"/>
+                    <a:cs typeface="Courier New" panose="02070309020205020404" pitchFamily="49" charset="0"/>
+                  </a:rPr>
+                  <a:t>m(RT ~ 1 + Days)</a:t>
+                </a:r>
+              </a:p>
+              <a:p>
+                <a:r>
+                  <a:rPr lang="en-GB" dirty="0" smtClean="0"/>
+                  <a:t>Intercept </a:t>
+                </a:r>
+                <a:r>
+                  <a:rPr lang="en-GB" sz="1200" dirty="0"/>
+                  <a:t>(RT at day 0) </a:t>
+                </a:r>
+                <a:r>
+                  <a:rPr lang="en-GB" dirty="0" smtClean="0"/>
+                  <a:t>= </a:t>
+                </a:r>
+                <a14:m>
+                  <m:oMath xmlns:m="http://schemas.openxmlformats.org/officeDocument/2006/math">
+                    <m:sSub>
+                      <m:sSubPr>
+                        <m:ctrlPr>
+                          <a:rPr lang="en-GB" i="1" smtClean="0">
+                            <a:latin typeface="Cambria Math" panose="02040503050406030204" pitchFamily="18" charset="0"/>
+                          </a:rPr>
+                        </m:ctrlPr>
+                      </m:sSubPr>
+                      <m:e>
+                        <m:r>
+                          <a:rPr lang="en-GB" i="1" smtClean="0">
+                            <a:latin typeface="Cambria Math" panose="02040503050406030204" pitchFamily="18" charset="0"/>
+                            <a:ea typeface="Cambria Math" panose="02040503050406030204" pitchFamily="18" charset="0"/>
+                          </a:rPr>
+                          <m:t>𝛽</m:t>
+                        </m:r>
+                      </m:e>
+                      <m:sub>
+                        <m:r>
+                          <a:rPr lang="en-GB" b="0" i="1" smtClean="0">
+                            <a:latin typeface="Cambria Math" panose="02040503050406030204" pitchFamily="18" charset="0"/>
+                          </a:rPr>
+                          <m:t>0</m:t>
+                        </m:r>
+                      </m:sub>
+                    </m:sSub>
+                  </m:oMath>
+                </a14:m>
+                <a:endParaRPr lang="en-GB" sz="1200" dirty="0" smtClean="0"/>
+              </a:p>
+              <a:p>
+                <a:r>
+                  <a:rPr lang="en-GB" dirty="0" smtClean="0"/>
+                  <a:t>Slope </a:t>
+                </a:r>
+                <a:r>
+                  <a:rPr lang="en-GB" sz="1200" dirty="0"/>
+                  <a:t>(Change in RT each day</a:t>
+                </a:r>
+                <a:r>
+                  <a:rPr lang="en-GB" sz="1200" dirty="0" smtClean="0"/>
+                  <a:t>) </a:t>
+                </a:r>
+                <a:r>
+                  <a:rPr lang="en-GB" dirty="0" smtClean="0"/>
+                  <a:t>= </a:t>
+                </a:r>
+                <a14:m>
+                  <m:oMath xmlns:m="http://schemas.openxmlformats.org/officeDocument/2006/math">
+                    <m:sSub>
+                      <m:sSubPr>
+                        <m:ctrlPr>
+                          <a:rPr lang="en-GB" i="1" smtClean="0">
+                            <a:latin typeface="Cambria Math" panose="02040503050406030204" pitchFamily="18" charset="0"/>
+                          </a:rPr>
+                        </m:ctrlPr>
+                      </m:sSubPr>
+                      <m:e>
+                        <m:r>
+                          <a:rPr lang="en-GB" i="1" smtClean="0">
+                            <a:latin typeface="Cambria Math" panose="02040503050406030204" pitchFamily="18" charset="0"/>
+                            <a:ea typeface="Cambria Math" panose="02040503050406030204" pitchFamily="18" charset="0"/>
+                          </a:rPr>
+                          <m:t>𝛽</m:t>
+                        </m:r>
+                      </m:e>
+                      <m:sub>
+                        <m:r>
+                          <a:rPr lang="en-GB" b="0" i="1" smtClean="0">
+                            <a:latin typeface="Cambria Math" panose="02040503050406030204" pitchFamily="18" charset="0"/>
+                            <a:ea typeface="Cambria Math" panose="02040503050406030204" pitchFamily="18" charset="0"/>
+                          </a:rPr>
+                          <m:t>1</m:t>
+                        </m:r>
+                      </m:sub>
+                    </m:sSub>
+                  </m:oMath>
+                </a14:m>
+                <a:endParaRPr lang="en-GB" dirty="0"/>
+              </a:p>
+            </p:txBody>
+          </p:sp>
+        </mc:Choice>
+        <mc:Fallback xmlns="">
+          <p:sp>
+            <p:nvSpPr>
+              <p:cNvPr id="139" name="TextBox 138"/>
+              <p:cNvSpPr txBox="1">
+                <a:spLocks noRot="1" noChangeAspect="1" noMove="1" noResize="1" noEditPoints="1" noAdjustHandles="1" noChangeArrowheads="1" noChangeShapeType="1" noTextEdit="1"/>
+              </p:cNvSpPr>
+              <p:nvPr/>
+            </p:nvSpPr>
+            <p:spPr>
+              <a:xfrm>
+                <a:off x="2568633" y="555296"/>
+                <a:ext cx="3514477" cy="923330"/>
+              </a:xfrm>
+              <a:prstGeom prst="rect">
+                <a:avLst/>
+              </a:prstGeom>
+              <a:blipFill>
+                <a:blip r:embed="rId4"/>
+                <a:stretch>
+                  <a:fillRect l="-1386" t="-3289" b="-9211"/>
+                </a:stretch>
+              </a:blipFill>
+            </p:spPr>
+            <p:txBody>
+              <a:bodyPr/>
+              <a:lstStyle/>
+              <a:p>
+                <a:r>
+                  <a:rPr lang="en-GB">
+                    <a:noFill/>
+                  </a:rPr>
+                  <a:t> </a:t>
+                </a:r>
+              </a:p>
+            </p:txBody>
+          </p:sp>
+        </mc:Fallback>
+      </mc:AlternateContent>
+      <p:sp>
+        <p:nvSpPr>
+          <p:cNvPr id="72" name="TextBox 71"/>
+          <p:cNvSpPr txBox="1"/>
+          <p:nvPr/>
+        </p:nvSpPr>
+        <p:spPr>
+          <a:xfrm>
+            <a:off x="4464495" y="5324180"/>
+            <a:ext cx="2525948" cy="369332"/>
+          </a:xfrm>
+          <a:prstGeom prst="rect">
+            <a:avLst/>
+          </a:prstGeom>
+          <a:noFill/>
+        </p:spPr>
+        <p:txBody>
+          <a:bodyPr wrap="none" rtlCol="0">
+            <a:spAutoFit/>
+          </a:bodyPr>
+          <a:lstStyle/>
+          <a:p>
+            <a:r>
+              <a:rPr lang="en-GB" dirty="0"/>
+              <a:t>d</a:t>
+            </a:r>
+            <a:r>
+              <a:rPr lang="en-GB" dirty="0" smtClean="0"/>
+              <a:t>ays of sleep deprivation</a:t>
+            </a:r>
+            <a:endParaRPr lang="en-GB" dirty="0"/>
+          </a:p>
+        </p:txBody>
+      </p:sp>
+      <p:sp>
+        <p:nvSpPr>
+          <p:cNvPr id="38" name="Oval 19"/>
+          <p:cNvSpPr>
+            <a:spLocks noChangeArrowheads="1"/>
+          </p:cNvSpPr>
+          <p:nvPr/>
+        </p:nvSpPr>
+        <p:spPr bwMode="auto">
+          <a:xfrm>
+            <a:off x="4850510" y="2619177"/>
+            <a:ext cx="57150" cy="57150"/>
+          </a:xfrm>
+          <a:prstGeom prst="ellipse">
+            <a:avLst/>
+          </a:prstGeom>
+          <a:solidFill>
+            <a:schemeClr val="bg1">
+              <a:lumMod val="95000"/>
+            </a:schemeClr>
+          </a:solidFill>
+          <a:ln w="9525" cap="rnd">
+            <a:solidFill>
+              <a:schemeClr val="bg2">
+                <a:lumMod val="75000"/>
+              </a:schemeClr>
+            </a:solidFill>
+            <a:prstDash val="solid"/>
+            <a:round/>
+            <a:headEnd/>
+            <a:tailEnd/>
+          </a:ln>
+          <a:extLst/>
+        </p:spPr>
+        <p:txBody>
+          <a:bodyPr vert="horz" wrap="square" lIns="91440" tIns="45720" rIns="91440" bIns="45720" numCol="1" anchor="t" anchorCtr="0" compatLnSpc="1">
+            <a:prstTxWarp prst="textNoShape">
+              <a:avLst/>
+            </a:prstTxWarp>
+          </a:bodyPr>
+          <a:lstStyle/>
+          <a:p>
+            <a:endParaRPr lang="en-GB"/>
+          </a:p>
+        </p:txBody>
+      </p:sp>
+      <p:sp>
+        <p:nvSpPr>
+          <p:cNvPr id="39" name="TextBox 38"/>
+          <p:cNvSpPr txBox="1"/>
+          <p:nvPr/>
+        </p:nvSpPr>
+        <p:spPr>
+          <a:xfrm>
+            <a:off x="5052700" y="2468996"/>
+            <a:ext cx="1030410" cy="369332"/>
+          </a:xfrm>
+          <a:prstGeom prst="rect">
+            <a:avLst/>
+          </a:prstGeom>
+          <a:noFill/>
+          <a:ln>
+            <a:solidFill>
+              <a:schemeClr val="bg2">
+                <a:lumMod val="90000"/>
+              </a:schemeClr>
+            </a:solidFill>
+          </a:ln>
+        </p:spPr>
+        <p:txBody>
+          <a:bodyPr wrap="none" rtlCol="0">
+            <a:spAutoFit/>
+          </a:bodyPr>
+          <a:lstStyle/>
+          <a:p>
+            <a:r>
+              <a:rPr lang="en-GB" dirty="0" smtClean="0">
+                <a:solidFill>
+                  <a:schemeClr val="bg1">
+                    <a:lumMod val="85000"/>
+                  </a:schemeClr>
+                </a:solidFill>
+              </a:rPr>
+              <a:t>Umberto</a:t>
+            </a:r>
+            <a:endParaRPr lang="en-GB" dirty="0">
+              <a:solidFill>
+                <a:schemeClr val="bg1">
+                  <a:lumMod val="85000"/>
+                </a:schemeClr>
+              </a:solidFill>
+            </a:endParaRPr>
+          </a:p>
+        </p:txBody>
+      </p:sp>
+      <p:sp>
+        <p:nvSpPr>
+          <p:cNvPr id="40" name="Oval 19"/>
+          <p:cNvSpPr>
+            <a:spLocks noChangeArrowheads="1"/>
+          </p:cNvSpPr>
+          <p:nvPr/>
+        </p:nvSpPr>
+        <p:spPr bwMode="auto">
+          <a:xfrm>
+            <a:off x="6083110" y="3473782"/>
+            <a:ext cx="57150" cy="57150"/>
+          </a:xfrm>
+          <a:prstGeom prst="ellipse">
+            <a:avLst/>
+          </a:prstGeom>
+          <a:solidFill>
+            <a:schemeClr val="bg1">
+              <a:lumMod val="95000"/>
+            </a:schemeClr>
+          </a:solidFill>
+          <a:ln w="9525" cap="rnd">
+            <a:solidFill>
+              <a:schemeClr val="bg2">
+                <a:lumMod val="75000"/>
+              </a:schemeClr>
+            </a:solidFill>
+            <a:prstDash val="solid"/>
+            <a:round/>
+            <a:headEnd/>
+            <a:tailEnd/>
+          </a:ln>
+          <a:extLst/>
+        </p:spPr>
+        <p:txBody>
+          <a:bodyPr vert="horz" wrap="square" lIns="91440" tIns="45720" rIns="91440" bIns="45720" numCol="1" anchor="t" anchorCtr="0" compatLnSpc="1">
+            <a:prstTxWarp prst="textNoShape">
+              <a:avLst/>
+            </a:prstTxWarp>
+          </a:bodyPr>
+          <a:lstStyle/>
+          <a:p>
+            <a:endParaRPr lang="en-GB"/>
+          </a:p>
+        </p:txBody>
+      </p:sp>
+      <p:sp>
+        <p:nvSpPr>
+          <p:cNvPr id="41" name="TextBox 40"/>
+          <p:cNvSpPr txBox="1"/>
+          <p:nvPr/>
+        </p:nvSpPr>
+        <p:spPr>
+          <a:xfrm>
+            <a:off x="6285300" y="3323601"/>
+            <a:ext cx="581954" cy="369332"/>
+          </a:xfrm>
+          <a:prstGeom prst="rect">
+            <a:avLst/>
+          </a:prstGeom>
+          <a:noFill/>
+          <a:ln>
+            <a:solidFill>
+              <a:schemeClr val="bg2">
+                <a:lumMod val="90000"/>
+              </a:schemeClr>
+            </a:solidFill>
+          </a:ln>
+        </p:spPr>
+        <p:txBody>
+          <a:bodyPr wrap="none" rtlCol="0">
+            <a:spAutoFit/>
+          </a:bodyPr>
+          <a:lstStyle/>
+          <a:p>
+            <a:r>
+              <a:rPr lang="en-GB" dirty="0" smtClean="0">
+                <a:solidFill>
+                  <a:schemeClr val="bg1">
+                    <a:lumMod val="85000"/>
+                  </a:schemeClr>
+                </a:solidFill>
+              </a:rPr>
+              <a:t>Alex</a:t>
+            </a:r>
+            <a:endParaRPr lang="en-GB" dirty="0">
+              <a:solidFill>
+                <a:schemeClr val="bg1">
+                  <a:lumMod val="85000"/>
+                </a:schemeClr>
+              </a:solidFill>
+            </a:endParaRPr>
+          </a:p>
+        </p:txBody>
+      </p:sp>
+      <p:sp>
+        <p:nvSpPr>
+          <p:cNvPr id="42" name="Oval 19"/>
+          <p:cNvSpPr>
+            <a:spLocks noChangeArrowheads="1"/>
+          </p:cNvSpPr>
+          <p:nvPr/>
+        </p:nvSpPr>
+        <p:spPr bwMode="auto">
+          <a:xfrm>
+            <a:off x="3321441" y="3035555"/>
+            <a:ext cx="57150" cy="57150"/>
+          </a:xfrm>
+          <a:prstGeom prst="ellipse">
+            <a:avLst/>
+          </a:prstGeom>
+          <a:solidFill>
+            <a:schemeClr val="bg1">
+              <a:lumMod val="95000"/>
+            </a:schemeClr>
+          </a:solidFill>
+          <a:ln w="9525" cap="rnd">
+            <a:solidFill>
+              <a:schemeClr val="bg2">
+                <a:lumMod val="75000"/>
+              </a:schemeClr>
+            </a:solidFill>
+            <a:prstDash val="solid"/>
+            <a:round/>
+            <a:headEnd/>
+            <a:tailEnd/>
+          </a:ln>
+          <a:extLst/>
+        </p:spPr>
+        <p:txBody>
+          <a:bodyPr vert="horz" wrap="square" lIns="91440" tIns="45720" rIns="91440" bIns="45720" numCol="1" anchor="t" anchorCtr="0" compatLnSpc="1">
+            <a:prstTxWarp prst="textNoShape">
+              <a:avLst/>
+            </a:prstTxWarp>
+          </a:bodyPr>
+          <a:lstStyle/>
+          <a:p>
+            <a:endParaRPr lang="en-GB"/>
+          </a:p>
+        </p:txBody>
+      </p:sp>
+      <p:sp>
+        <p:nvSpPr>
+          <p:cNvPr id="43" name="TextBox 42"/>
+          <p:cNvSpPr txBox="1"/>
+          <p:nvPr/>
+        </p:nvSpPr>
+        <p:spPr>
+          <a:xfrm>
+            <a:off x="3523631" y="2885374"/>
+            <a:ext cx="884858" cy="369332"/>
+          </a:xfrm>
+          <a:prstGeom prst="rect">
+            <a:avLst/>
+          </a:prstGeom>
+          <a:noFill/>
+          <a:ln>
+            <a:solidFill>
+              <a:schemeClr val="bg2">
+                <a:lumMod val="90000"/>
+              </a:schemeClr>
+            </a:solidFill>
+          </a:ln>
+        </p:spPr>
+        <p:txBody>
+          <a:bodyPr wrap="none" rtlCol="0">
+            <a:spAutoFit/>
+          </a:bodyPr>
+          <a:lstStyle/>
+          <a:p>
+            <a:r>
+              <a:rPr lang="en-GB" dirty="0" smtClean="0">
+                <a:solidFill>
+                  <a:schemeClr val="bg1">
+                    <a:lumMod val="85000"/>
+                  </a:schemeClr>
+                </a:solidFill>
+              </a:rPr>
+              <a:t>Monica</a:t>
+            </a:r>
+            <a:endParaRPr lang="en-GB" dirty="0">
+              <a:solidFill>
+                <a:schemeClr val="bg1">
+                  <a:lumMod val="85000"/>
+                </a:schemeClr>
+              </a:solidFill>
+            </a:endParaRPr>
+          </a:p>
+        </p:txBody>
+      </p:sp>
+      <p:sp>
+        <p:nvSpPr>
+          <p:cNvPr id="46" name="Oval 19"/>
+          <p:cNvSpPr>
+            <a:spLocks noChangeArrowheads="1"/>
+          </p:cNvSpPr>
+          <p:nvPr/>
+        </p:nvSpPr>
+        <p:spPr bwMode="auto">
+          <a:xfrm>
+            <a:off x="7650246" y="2962837"/>
+            <a:ext cx="57150" cy="57150"/>
+          </a:xfrm>
+          <a:prstGeom prst="ellipse">
+            <a:avLst/>
+          </a:prstGeom>
+          <a:solidFill>
+            <a:schemeClr val="bg1">
+              <a:lumMod val="95000"/>
+            </a:schemeClr>
+          </a:solidFill>
+          <a:ln w="9525" cap="rnd">
+            <a:solidFill>
+              <a:schemeClr val="bg2">
+                <a:lumMod val="75000"/>
+              </a:schemeClr>
+            </a:solidFill>
+            <a:prstDash val="solid"/>
+            <a:round/>
+            <a:headEnd/>
+            <a:tailEnd/>
+          </a:ln>
+          <a:extLst/>
+        </p:spPr>
+        <p:txBody>
+          <a:bodyPr vert="horz" wrap="square" lIns="91440" tIns="45720" rIns="91440" bIns="45720" numCol="1" anchor="t" anchorCtr="0" compatLnSpc="1">
+            <a:prstTxWarp prst="textNoShape">
+              <a:avLst/>
+            </a:prstTxWarp>
+          </a:bodyPr>
+          <a:lstStyle/>
+          <a:p>
+            <a:endParaRPr lang="en-GB"/>
+          </a:p>
+        </p:txBody>
+      </p:sp>
+      <p:sp>
+        <p:nvSpPr>
+          <p:cNvPr id="47" name="TextBox 46"/>
+          <p:cNvSpPr txBox="1"/>
+          <p:nvPr/>
+        </p:nvSpPr>
+        <p:spPr>
+          <a:xfrm>
+            <a:off x="7852436" y="2812656"/>
+            <a:ext cx="776175" cy="369332"/>
+          </a:xfrm>
+          <a:prstGeom prst="rect">
+            <a:avLst/>
+          </a:prstGeom>
+          <a:noFill/>
+          <a:ln>
+            <a:solidFill>
+              <a:schemeClr val="bg2">
+                <a:lumMod val="90000"/>
+              </a:schemeClr>
+            </a:solidFill>
+          </a:ln>
+        </p:spPr>
+        <p:txBody>
+          <a:bodyPr wrap="none" rtlCol="0">
+            <a:spAutoFit/>
+          </a:bodyPr>
+          <a:lstStyle/>
+          <a:p>
+            <a:r>
+              <a:rPr lang="en-GB" dirty="0" smtClean="0">
+                <a:solidFill>
+                  <a:schemeClr val="bg1">
+                    <a:lumMod val="85000"/>
+                  </a:schemeClr>
+                </a:solidFill>
+              </a:rPr>
+              <a:t>Emma</a:t>
+            </a:r>
+            <a:endParaRPr lang="en-GB" dirty="0">
+              <a:solidFill>
+                <a:schemeClr val="bg1">
+                  <a:lumMod val="85000"/>
+                </a:schemeClr>
+              </a:solidFill>
+            </a:endParaRPr>
+          </a:p>
+        </p:txBody>
+      </p:sp>
+    </p:spTree>
+    <p:extLst>
+      <p:ext uri="{BB962C8B-B14F-4D97-AF65-F5344CB8AC3E}">
+        <p14:creationId xmlns:p14="http://schemas.microsoft.com/office/powerpoint/2010/main" val="175576941"/>
+      </p:ext>
+    </p:extLst>
+  </p:cSld>
+  <p:clrMapOvr>
+    <a:masterClrMapping/>
+  </p:clrMapOvr>
+</p:sld>
+</file>
+
 <file path=ppt/slides/slide2.xml><?xml version="1.0" encoding="utf-8"?>
 <p:sld xmlns:a="http://schemas.openxmlformats.org/drawingml/2006/main" xmlns:r="http://schemas.openxmlformats.org/officeDocument/2006/relationships" xmlns:p="http://schemas.openxmlformats.org/presentationml/2006/main">
   <p:cSld>
@@ -51727,8 +52959,8 @@
           </a:p>
         </p:txBody>
       </p:sp>
-      <mc:AlternateContent xmlns:mc="http://schemas.openxmlformats.org/markup-compatibility/2006">
-        <mc:Choice xmlns:a14="http://schemas.microsoft.com/office/drawing/2010/main" Requires="a14">
+      <mc:AlternateContent xmlns:mc="http://schemas.openxmlformats.org/markup-compatibility/2006" xmlns:a14="http://schemas.microsoft.com/office/drawing/2010/main">
+        <mc:Choice Requires="a14">
           <p:sp>
             <p:nvSpPr>
               <p:cNvPr id="4" name="Rectangle 3"/>
@@ -51750,6 +52982,7 @@
               </a:bodyPr>
               <a:lstStyle/>
               <a:p>
+                <a:pPr/>
                 <a14:m>
                   <m:oMathPara xmlns:m="http://schemas.openxmlformats.org/officeDocument/2006/math">
                     <m:oMathParaPr>
@@ -51773,7 +53006,7 @@
             </p:txBody>
           </p:sp>
         </mc:Choice>
-        <mc:Fallback>
+        <mc:Fallback xmlns="">
           <p:sp>
             <p:nvSpPr>
               <p:cNvPr id="4" name="Rectangle 3"/>

</xml_diff>